<commit_message>
Minor adjustment of pipeline figure
</commit_message>
<xml_diff>
--- a/2-Chapters/1-Chapter/img/pipeline.pptx
+++ b/2-Chapters/1-Chapter/img/pipeline.pptx
@@ -243,7 +243,7 @@
           <a:p>
             <a:fld id="{6C042738-0D19-4AAE-9D14-32B601A83945}" type="datetimeFigureOut">
               <a:rPr lang="fr-FR" smtClean="0"/>
-              <a:t>12/05/2020</a:t>
+              <a:t>14/05/2020</a:t>
             </a:fld>
             <a:endParaRPr lang="fr-FR" dirty="0"/>
           </a:p>
@@ -413,7 +413,7 @@
           <a:p>
             <a:fld id="{6C042738-0D19-4AAE-9D14-32B601A83945}" type="datetimeFigureOut">
               <a:rPr lang="fr-FR" smtClean="0"/>
-              <a:t>12/05/2020</a:t>
+              <a:t>14/05/2020</a:t>
             </a:fld>
             <a:endParaRPr lang="fr-FR" dirty="0"/>
           </a:p>
@@ -593,7 +593,7 @@
           <a:p>
             <a:fld id="{6C042738-0D19-4AAE-9D14-32B601A83945}" type="datetimeFigureOut">
               <a:rPr lang="fr-FR" smtClean="0"/>
-              <a:t>12/05/2020</a:t>
+              <a:t>14/05/2020</a:t>
             </a:fld>
             <a:endParaRPr lang="fr-FR" dirty="0"/>
           </a:p>
@@ -763,7 +763,7 @@
           <a:p>
             <a:fld id="{6C042738-0D19-4AAE-9D14-32B601A83945}" type="datetimeFigureOut">
               <a:rPr lang="fr-FR" smtClean="0"/>
-              <a:t>12/05/2020</a:t>
+              <a:t>14/05/2020</a:t>
             </a:fld>
             <a:endParaRPr lang="fr-FR" dirty="0"/>
           </a:p>
@@ -1007,7 +1007,7 @@
           <a:p>
             <a:fld id="{6C042738-0D19-4AAE-9D14-32B601A83945}" type="datetimeFigureOut">
               <a:rPr lang="fr-FR" smtClean="0"/>
-              <a:t>12/05/2020</a:t>
+              <a:t>14/05/2020</a:t>
             </a:fld>
             <a:endParaRPr lang="fr-FR" dirty="0"/>
           </a:p>
@@ -1239,7 +1239,7 @@
           <a:p>
             <a:fld id="{6C042738-0D19-4AAE-9D14-32B601A83945}" type="datetimeFigureOut">
               <a:rPr lang="fr-FR" smtClean="0"/>
-              <a:t>12/05/2020</a:t>
+              <a:t>14/05/2020</a:t>
             </a:fld>
             <a:endParaRPr lang="fr-FR" dirty="0"/>
           </a:p>
@@ -1606,7 +1606,7 @@
           <a:p>
             <a:fld id="{6C042738-0D19-4AAE-9D14-32B601A83945}" type="datetimeFigureOut">
               <a:rPr lang="fr-FR" smtClean="0"/>
-              <a:t>12/05/2020</a:t>
+              <a:t>14/05/2020</a:t>
             </a:fld>
             <a:endParaRPr lang="fr-FR" dirty="0"/>
           </a:p>
@@ -1724,7 +1724,7 @@
           <a:p>
             <a:fld id="{6C042738-0D19-4AAE-9D14-32B601A83945}" type="datetimeFigureOut">
               <a:rPr lang="fr-FR" smtClean="0"/>
-              <a:t>12/05/2020</a:t>
+              <a:t>14/05/2020</a:t>
             </a:fld>
             <a:endParaRPr lang="fr-FR" dirty="0"/>
           </a:p>
@@ -1819,7 +1819,7 @@
           <a:p>
             <a:fld id="{6C042738-0D19-4AAE-9D14-32B601A83945}" type="datetimeFigureOut">
               <a:rPr lang="fr-FR" smtClean="0"/>
-              <a:t>12/05/2020</a:t>
+              <a:t>14/05/2020</a:t>
             </a:fld>
             <a:endParaRPr lang="fr-FR" dirty="0"/>
           </a:p>
@@ -2096,7 +2096,7 @@
           <a:p>
             <a:fld id="{6C042738-0D19-4AAE-9D14-32B601A83945}" type="datetimeFigureOut">
               <a:rPr lang="fr-FR" smtClean="0"/>
-              <a:t>12/05/2020</a:t>
+              <a:t>14/05/2020</a:t>
             </a:fld>
             <a:endParaRPr lang="fr-FR" dirty="0"/>
           </a:p>
@@ -2353,7 +2353,7 @@
           <a:p>
             <a:fld id="{6C042738-0D19-4AAE-9D14-32B601A83945}" type="datetimeFigureOut">
               <a:rPr lang="fr-FR" smtClean="0"/>
-              <a:t>12/05/2020</a:t>
+              <a:t>14/05/2020</a:t>
             </a:fld>
             <a:endParaRPr lang="fr-FR" dirty="0"/>
           </a:p>
@@ -2566,7 +2566,7 @@
           <a:p>
             <a:fld id="{6C042738-0D19-4AAE-9D14-32B601A83945}" type="datetimeFigureOut">
               <a:rPr lang="fr-FR" smtClean="0"/>
-              <a:t>12/05/2020</a:t>
+              <a:t>14/05/2020</a:t>
             </a:fld>
             <a:endParaRPr lang="fr-FR" dirty="0"/>
           </a:p>
@@ -2985,7 +2985,7 @@
           </p:cNvPicPr>
           <p:nvPr/>
         </p:nvPicPr>
-        <p:blipFill>
+        <p:blipFill rotWithShape="1">
           <a:blip r:embed="rId2">
             <a:extLst>
               <a:ext uri="{28A0092B-C50C-407E-A947-70E740481C1C}">
@@ -2993,14 +2993,13 @@
               </a:ext>
             </a:extLst>
           </a:blip>
-          <a:stretch>
-            <a:fillRect/>
-          </a:stretch>
+          <a:srcRect b="10572"/>
+          <a:stretch/>
         </p:blipFill>
         <p:spPr>
           <a:xfrm>
-            <a:off x="3582693" y="8657832"/>
-            <a:ext cx="2499374" cy="2042076"/>
+            <a:off x="3258428" y="7845158"/>
+            <a:ext cx="2115779" cy="1525583"/>
           </a:xfrm>
           <a:prstGeom prst="rect">
             <a:avLst/>
@@ -3021,7 +3020,7 @@
         </p:nvSpPr>
         <p:spPr>
           <a:xfrm>
-            <a:off x="648681" y="1198526"/>
+            <a:off x="663430" y="726578"/>
             <a:ext cx="7683477" cy="1850046"/>
           </a:xfrm>
           <a:prstGeom prst="roundRect">
@@ -3075,7 +3074,7 @@
         </p:nvSpPr>
         <p:spPr>
           <a:xfrm>
-            <a:off x="648681" y="1198525"/>
+            <a:off x="663430" y="726577"/>
             <a:ext cx="7683477" cy="665192"/>
           </a:xfrm>
           <a:prstGeom prst="rect">
@@ -3118,7 +3117,7 @@
         </p:nvSpPr>
         <p:spPr>
           <a:xfrm>
-            <a:off x="658030" y="3686449"/>
+            <a:off x="672779" y="3214501"/>
             <a:ext cx="7683477" cy="3668314"/>
           </a:xfrm>
           <a:prstGeom prst="roundRect">
@@ -3172,7 +3171,7 @@
         </p:nvSpPr>
         <p:spPr>
           <a:xfrm>
-            <a:off x="658030" y="3686449"/>
+            <a:off x="672779" y="3214501"/>
             <a:ext cx="7683477" cy="665192"/>
           </a:xfrm>
           <a:prstGeom prst="rect">
@@ -3215,8 +3214,8 @@
         </p:nvSpPr>
         <p:spPr>
           <a:xfrm>
-            <a:off x="658030" y="7992642"/>
-            <a:ext cx="7683477" cy="2876404"/>
+            <a:off x="672779" y="7520694"/>
+            <a:ext cx="7683477" cy="1976967"/>
           </a:xfrm>
           <a:prstGeom prst="roundRect">
             <a:avLst/>
@@ -3269,7 +3268,7 @@
         </p:nvSpPr>
         <p:spPr>
           <a:xfrm>
-            <a:off x="658030" y="7992640"/>
+            <a:off x="672779" y="7520692"/>
             <a:ext cx="7683477" cy="665192"/>
           </a:xfrm>
           <a:prstGeom prst="rect">
@@ -3312,7 +3311,7 @@
         </p:nvSpPr>
         <p:spPr>
           <a:xfrm>
-            <a:off x="1132529" y="1894154"/>
+            <a:off x="1147278" y="1422206"/>
             <a:ext cx="6735138" cy="819327"/>
           </a:xfrm>
           <a:prstGeom prst="rect">
@@ -3375,7 +3374,7 @@
         </p:blipFill>
         <p:spPr>
           <a:xfrm>
-            <a:off x="935978" y="5334854"/>
+            <a:off x="950727" y="4862906"/>
             <a:ext cx="2089575" cy="1868569"/>
           </a:xfrm>
           <a:prstGeom prst="rect">
@@ -3411,7 +3410,7 @@
         </p:blipFill>
         <p:spPr>
           <a:xfrm>
-            <a:off x="3165963" y="5279502"/>
+            <a:off x="3180712" y="4807554"/>
             <a:ext cx="2277886" cy="1901456"/>
           </a:xfrm>
           <a:prstGeom prst="rect">
@@ -3446,7 +3445,7 @@
         </p:blipFill>
         <p:spPr>
           <a:xfrm>
-            <a:off x="5778092" y="5580306"/>
+            <a:off x="5792841" y="5108358"/>
             <a:ext cx="2089575" cy="1299847"/>
           </a:xfrm>
           <a:prstGeom prst="rect">
@@ -3468,7 +3467,7 @@
         </p:nvSpPr>
         <p:spPr>
           <a:xfrm>
-            <a:off x="1319788" y="4523411"/>
+            <a:off x="1334537" y="4051463"/>
             <a:ext cx="1601147" cy="665191"/>
           </a:xfrm>
           <a:prstGeom prst="rect">
@@ -3507,7 +3506,7 @@
         </p:nvSpPr>
         <p:spPr>
           <a:xfrm>
-            <a:off x="3582693" y="4523411"/>
+            <a:off x="3597442" y="4051463"/>
             <a:ext cx="1601147" cy="646331"/>
           </a:xfrm>
           <a:prstGeom prst="rect">
@@ -3553,7 +3552,7 @@
         </p:nvSpPr>
         <p:spPr>
           <a:xfrm>
-            <a:off x="5827661" y="4523410"/>
+            <a:off x="5842410" y="4051462"/>
             <a:ext cx="1601147" cy="646331"/>
           </a:xfrm>
           <a:prstGeom prst="rect">
@@ -3599,7 +3598,7 @@
         </p:nvSpPr>
         <p:spPr>
           <a:xfrm>
-            <a:off x="1980765" y="9295709"/>
+            <a:off x="1358077" y="8382381"/>
             <a:ext cx="1601147" cy="646331"/>
           </a:xfrm>
           <a:prstGeom prst="rect">
@@ -3641,7 +3640,7 @@
         </p:nvCxnSpPr>
         <p:spPr>
           <a:xfrm>
-            <a:off x="4490420" y="3048572"/>
+            <a:off x="4505169" y="2576624"/>
             <a:ext cx="9349" cy="637877"/>
           </a:xfrm>
           <a:prstGeom prst="straightConnector1">
@@ -3684,7 +3683,7 @@
         </p:nvCxnSpPr>
         <p:spPr>
           <a:xfrm>
-            <a:off x="4499769" y="7354763"/>
+            <a:off x="4514518" y="6882815"/>
             <a:ext cx="0" cy="637877"/>
           </a:xfrm>
           <a:prstGeom prst="straightConnector1">
@@ -3723,7 +3722,7 @@
         </p:nvSpPr>
         <p:spPr>
           <a:xfrm>
-            <a:off x="4638851" y="3166286"/>
+            <a:off x="4653600" y="2694338"/>
             <a:ext cx="3210118" cy="369332"/>
           </a:xfrm>
           <a:prstGeom prst="rect">
@@ -3758,7 +3757,7 @@
         </p:nvSpPr>
         <p:spPr>
           <a:xfrm>
-            <a:off x="4638851" y="7489035"/>
+            <a:off x="4653600" y="7017087"/>
             <a:ext cx="3210118" cy="369332"/>
           </a:xfrm>
           <a:prstGeom prst="rect">
@@ -3796,8 +3795,8 @@
         </p:nvCxnSpPr>
         <p:spPr>
           <a:xfrm>
-            <a:off x="4499769" y="10869046"/>
-            <a:ext cx="0" cy="593258"/>
+            <a:off x="4514518" y="9497661"/>
+            <a:ext cx="0" cy="781965"/>
           </a:xfrm>
           <a:prstGeom prst="straightConnector1">
             <a:avLst/>
@@ -3835,7 +3834,7 @@
         </p:nvSpPr>
         <p:spPr>
           <a:xfrm>
-            <a:off x="4635092" y="10998442"/>
+            <a:off x="4649841" y="9703977"/>
             <a:ext cx="3210118" cy="369332"/>
           </a:xfrm>
           <a:prstGeom prst="rect">
@@ -3850,7 +3849,7 @@
           <a:lstStyle/>
           <a:p>
             <a:r>
-              <a:rPr lang="en-GB"/>
+              <a:rPr lang="en-GB" dirty="0"/>
               <a:t>Throttle/steering commands</a:t>
             </a:r>
           </a:p>
@@ -3873,7 +3872,7 @@
         </p:nvCxnSpPr>
         <p:spPr>
           <a:xfrm>
-            <a:off x="4490419" y="605268"/>
+            <a:off x="4505168" y="133320"/>
             <a:ext cx="1" cy="593257"/>
           </a:xfrm>
           <a:prstGeom prst="straightConnector1">
@@ -3912,7 +3911,7 @@
         </p:nvSpPr>
         <p:spPr>
           <a:xfrm>
-            <a:off x="4635092" y="668974"/>
+            <a:off x="4649841" y="197026"/>
             <a:ext cx="3210118" cy="369332"/>
           </a:xfrm>
           <a:prstGeom prst="rect">

</xml_diff>

<commit_message>
Add order of decision modules to Fig. 1.2
</commit_message>
<xml_diff>
--- a/2-Chapters/1-Chapter/img/pipeline.pptx
+++ b/2-Chapters/1-Chapter/img/pipeline.pptx
@@ -243,7 +243,7 @@
           <a:p>
             <a:fld id="{6C042738-0D19-4AAE-9D14-32B601A83945}" type="datetimeFigureOut">
               <a:rPr lang="fr-FR" smtClean="0"/>
-              <a:t>14/05/2020</a:t>
+              <a:t>08/08/2020</a:t>
             </a:fld>
             <a:endParaRPr lang="fr-FR" dirty="0"/>
           </a:p>
@@ -413,7 +413,7 @@
           <a:p>
             <a:fld id="{6C042738-0D19-4AAE-9D14-32B601A83945}" type="datetimeFigureOut">
               <a:rPr lang="fr-FR" smtClean="0"/>
-              <a:t>14/05/2020</a:t>
+              <a:t>08/08/2020</a:t>
             </a:fld>
             <a:endParaRPr lang="fr-FR" dirty="0"/>
           </a:p>
@@ -593,7 +593,7 @@
           <a:p>
             <a:fld id="{6C042738-0D19-4AAE-9D14-32B601A83945}" type="datetimeFigureOut">
               <a:rPr lang="fr-FR" smtClean="0"/>
-              <a:t>14/05/2020</a:t>
+              <a:t>08/08/2020</a:t>
             </a:fld>
             <a:endParaRPr lang="fr-FR" dirty="0"/>
           </a:p>
@@ -763,7 +763,7 @@
           <a:p>
             <a:fld id="{6C042738-0D19-4AAE-9D14-32B601A83945}" type="datetimeFigureOut">
               <a:rPr lang="fr-FR" smtClean="0"/>
-              <a:t>14/05/2020</a:t>
+              <a:t>08/08/2020</a:t>
             </a:fld>
             <a:endParaRPr lang="fr-FR" dirty="0"/>
           </a:p>
@@ -1007,7 +1007,7 @@
           <a:p>
             <a:fld id="{6C042738-0D19-4AAE-9D14-32B601A83945}" type="datetimeFigureOut">
               <a:rPr lang="fr-FR" smtClean="0"/>
-              <a:t>14/05/2020</a:t>
+              <a:t>08/08/2020</a:t>
             </a:fld>
             <a:endParaRPr lang="fr-FR" dirty="0"/>
           </a:p>
@@ -1239,7 +1239,7 @@
           <a:p>
             <a:fld id="{6C042738-0D19-4AAE-9D14-32B601A83945}" type="datetimeFigureOut">
               <a:rPr lang="fr-FR" smtClean="0"/>
-              <a:t>14/05/2020</a:t>
+              <a:t>08/08/2020</a:t>
             </a:fld>
             <a:endParaRPr lang="fr-FR" dirty="0"/>
           </a:p>
@@ -1606,7 +1606,7 @@
           <a:p>
             <a:fld id="{6C042738-0D19-4AAE-9D14-32B601A83945}" type="datetimeFigureOut">
               <a:rPr lang="fr-FR" smtClean="0"/>
-              <a:t>14/05/2020</a:t>
+              <a:t>08/08/2020</a:t>
             </a:fld>
             <a:endParaRPr lang="fr-FR" dirty="0"/>
           </a:p>
@@ -1724,7 +1724,7 @@
           <a:p>
             <a:fld id="{6C042738-0D19-4AAE-9D14-32B601A83945}" type="datetimeFigureOut">
               <a:rPr lang="fr-FR" smtClean="0"/>
-              <a:t>14/05/2020</a:t>
+              <a:t>08/08/2020</a:t>
             </a:fld>
             <a:endParaRPr lang="fr-FR" dirty="0"/>
           </a:p>
@@ -1819,7 +1819,7 @@
           <a:p>
             <a:fld id="{6C042738-0D19-4AAE-9D14-32B601A83945}" type="datetimeFigureOut">
               <a:rPr lang="fr-FR" smtClean="0"/>
-              <a:t>14/05/2020</a:t>
+              <a:t>08/08/2020</a:t>
             </a:fld>
             <a:endParaRPr lang="fr-FR" dirty="0"/>
           </a:p>
@@ -2096,7 +2096,7 @@
           <a:p>
             <a:fld id="{6C042738-0D19-4AAE-9D14-32B601A83945}" type="datetimeFigureOut">
               <a:rPr lang="fr-FR" smtClean="0"/>
-              <a:t>14/05/2020</a:t>
+              <a:t>08/08/2020</a:t>
             </a:fld>
             <a:endParaRPr lang="fr-FR" dirty="0"/>
           </a:p>
@@ -2353,7 +2353,7 @@
           <a:p>
             <a:fld id="{6C042738-0D19-4AAE-9D14-32B601A83945}" type="datetimeFigureOut">
               <a:rPr lang="fr-FR" smtClean="0"/>
-              <a:t>14/05/2020</a:t>
+              <a:t>08/08/2020</a:t>
             </a:fld>
             <a:endParaRPr lang="fr-FR" dirty="0"/>
           </a:p>
@@ -2566,7 +2566,7 @@
           <a:p>
             <a:fld id="{6C042738-0D19-4AAE-9D14-32B601A83945}" type="datetimeFigureOut">
               <a:rPr lang="fr-FR" smtClean="0"/>
-              <a:t>14/05/2020</a:t>
+              <a:t>08/08/2020</a:t>
             </a:fld>
             <a:endParaRPr lang="fr-FR" dirty="0"/>
           </a:p>
@@ -3481,9 +3481,9 @@
           </a:bodyPr>
           <a:lstStyle/>
           <a:p>
-            <a:pPr marL="285750" indent="-285750" algn="ctr">
-              <a:buFont typeface="Arial" panose="020B0604020202020204" pitchFamily="34" charset="0"/>
-              <a:buChar char="•"/>
+            <a:pPr marL="342900" indent="-342900" algn="ctr">
+              <a:buFont typeface="+mj-lt"/>
+              <a:buAutoNum type="arabicPeriod"/>
             </a:pPr>
             <a:r>
               <a:rPr lang="fr-FR" b="1" dirty="0"/>
@@ -3506,8 +3506,8 @@
         </p:nvSpPr>
         <p:spPr>
           <a:xfrm>
-            <a:off x="3597442" y="4051463"/>
-            <a:ext cx="1601147" cy="646331"/>
+            <a:off x="3451124" y="4051463"/>
+            <a:ext cx="1747466" cy="646331"/>
           </a:xfrm>
           <a:prstGeom prst="rect">
             <a:avLst/>
@@ -3520,9 +3520,9 @@
           </a:bodyPr>
           <a:lstStyle/>
           <a:p>
-            <a:pPr marL="285750" indent="-285750" algn="ctr">
-              <a:buFont typeface="Arial" panose="020B0604020202020204" pitchFamily="34" charset="0"/>
-              <a:buChar char="•"/>
+            <a:pPr marL="342900" indent="-342900" algn="ctr">
+              <a:buFont typeface="+mj-lt"/>
+              <a:buAutoNum type="arabicPeriod" startAt="2"/>
             </a:pPr>
             <a:r>
               <a:rPr lang="en-GB" b="1" dirty="0"/>
@@ -3566,9 +3566,9 @@
           </a:bodyPr>
           <a:lstStyle/>
           <a:p>
-            <a:pPr marL="285750" indent="-285750" algn="ctr">
-              <a:buFont typeface="Arial" panose="020B0604020202020204" pitchFamily="34" charset="0"/>
-              <a:buChar char="•"/>
+            <a:pPr marL="342900" indent="-342900" algn="ctr">
+              <a:buFont typeface="+mj-lt"/>
+              <a:buAutoNum type="arabicPeriod" startAt="3"/>
             </a:pPr>
             <a:r>
               <a:rPr lang="fr-FR" b="1" dirty="0"/>

</xml_diff>